<commit_message>
Small updates to report and powerpoint
</commit_message>
<xml_diff>
--- a/report/Powerpoint Final.pptx
+++ b/report/Powerpoint Final.pptx
@@ -11,14 +11,13 @@
     <p:sldId id="259" r:id="rId5"/>
     <p:sldId id="261" r:id="rId6"/>
     <p:sldId id="274" r:id="rId7"/>
-    <p:sldId id="260" r:id="rId8"/>
-    <p:sldId id="262" r:id="rId9"/>
+    <p:sldId id="269" r:id="rId8"/>
+    <p:sldId id="260" r:id="rId9"/>
     <p:sldId id="263" r:id="rId10"/>
     <p:sldId id="264" r:id="rId11"/>
     <p:sldId id="270" r:id="rId12"/>
-    <p:sldId id="269" r:id="rId13"/>
+    <p:sldId id="265" r:id="rId13"/>
     <p:sldId id="266" r:id="rId14"/>
-    <p:sldId id="265" r:id="rId15"/>
   </p:sldIdLst>
   <p:sldSz cx="12192000" cy="6858000"/>
   <p:notesSz cx="6858000" cy="9144000"/>
@@ -175,7 +174,7 @@
           <a:noFill/>
           <a:extLst>
             <a:ext uri="{909E8E84-426E-40dd-AFC4-6F175D3DCCD1}">
-              <a14:hiddenFill xmlns:a14="http://schemas.microsoft.com/office/drawing/2010/main" xmlns="">
+              <a14:hiddenFill xmlns="" xmlns:a14="http://schemas.microsoft.com/office/drawing/2010/main">
                 <a:solidFill>
                   <a:srgbClr val="FFFFFF"/>
                 </a:solidFill>
@@ -235,7 +234,7 @@
             </a:ln>
             <a:extLst>
               <a:ext uri="{91240B29-F687-4f45-9708-019B960494DF}">
-                <a14:hiddenLine xmlns:a14="http://schemas.microsoft.com/office/drawing/2010/main" xmlns="" w="9525">
+                <a14:hiddenLine xmlns="" xmlns:a14="http://schemas.microsoft.com/office/drawing/2010/main" w="9525">
                   <a:solidFill>
                     <a:srgbClr val="000000"/>
                   </a:solidFill>
@@ -325,7 +324,7 @@
             </a:ln>
             <a:extLst>
               <a:ext uri="{91240B29-F687-4f45-9708-019B960494DF}">
-                <a14:hiddenLine xmlns:a14="http://schemas.microsoft.com/office/drawing/2010/main" xmlns="" w="9525">
+                <a14:hiddenLine xmlns="" xmlns:a14="http://schemas.microsoft.com/office/drawing/2010/main" w="9525">
                   <a:solidFill>
                     <a:srgbClr val="000000"/>
                   </a:solidFill>
@@ -415,7 +414,7 @@
             </a:ln>
             <a:extLst>
               <a:ext uri="{91240B29-F687-4f45-9708-019B960494DF}">
-                <a14:hiddenLine xmlns:a14="http://schemas.microsoft.com/office/drawing/2010/main" xmlns="" w="9525">
+                <a14:hiddenLine xmlns="" xmlns:a14="http://schemas.microsoft.com/office/drawing/2010/main" w="9525">
                   <a:solidFill>
                     <a:srgbClr val="000000"/>
                   </a:solidFill>
@@ -449,7 +448,7 @@
             </a:ln>
             <a:extLst>
               <a:ext uri="{91240B29-F687-4f45-9708-019B960494DF}">
-                <a14:hiddenLine xmlns:a14="http://schemas.microsoft.com/office/drawing/2010/main" xmlns="" w="9525">
+                <a14:hiddenLine xmlns="" xmlns:a14="http://schemas.microsoft.com/office/drawing/2010/main" w="9525">
                   <a:solidFill>
                     <a:srgbClr val="000000"/>
                   </a:solidFill>
@@ -539,7 +538,7 @@
             </a:ln>
             <a:extLst>
               <a:ext uri="{91240B29-F687-4f45-9708-019B960494DF}">
-                <a14:hiddenLine xmlns:a14="http://schemas.microsoft.com/office/drawing/2010/main" xmlns="" w="9525">
+                <a14:hiddenLine xmlns="" xmlns:a14="http://schemas.microsoft.com/office/drawing/2010/main" w="9525">
                   <a:solidFill>
                     <a:srgbClr val="000000"/>
                   </a:solidFill>
@@ -601,7 +600,7 @@
             </a:ln>
             <a:extLst>
               <a:ext uri="{91240B29-F687-4f45-9708-019B960494DF}">
-                <a14:hiddenLine xmlns:a14="http://schemas.microsoft.com/office/drawing/2010/main" xmlns="" w="9525">
+                <a14:hiddenLine xmlns="" xmlns:a14="http://schemas.microsoft.com/office/drawing/2010/main" w="9525">
                   <a:solidFill>
                     <a:srgbClr val="000000"/>
                   </a:solidFill>
@@ -663,7 +662,7 @@
             </a:ln>
             <a:extLst>
               <a:ext uri="{91240B29-F687-4f45-9708-019B960494DF}">
-                <a14:hiddenLine xmlns:a14="http://schemas.microsoft.com/office/drawing/2010/main" xmlns="" w="9525">
+                <a14:hiddenLine xmlns="" xmlns:a14="http://schemas.microsoft.com/office/drawing/2010/main" w="9525">
                   <a:solidFill>
                     <a:srgbClr val="000000"/>
                   </a:solidFill>
@@ -753,7 +752,7 @@
             </a:ln>
             <a:extLst>
               <a:ext uri="{91240B29-F687-4f45-9708-019B960494DF}">
-                <a14:hiddenLine xmlns:a14="http://schemas.microsoft.com/office/drawing/2010/main" xmlns="" w="9525">
+                <a14:hiddenLine xmlns="" xmlns:a14="http://schemas.microsoft.com/office/drawing/2010/main" w="9525">
                   <a:solidFill>
                     <a:srgbClr val="000000"/>
                   </a:solidFill>
@@ -815,7 +814,7 @@
             </a:ln>
             <a:extLst>
               <a:ext uri="{91240B29-F687-4f45-9708-019B960494DF}">
-                <a14:hiddenLine xmlns:a14="http://schemas.microsoft.com/office/drawing/2010/main" xmlns="" w="9525">
+                <a14:hiddenLine xmlns="" xmlns:a14="http://schemas.microsoft.com/office/drawing/2010/main" w="9525">
                   <a:solidFill>
                     <a:srgbClr val="000000"/>
                   </a:solidFill>
@@ -877,7 +876,7 @@
             </a:ln>
             <a:extLst>
               <a:ext uri="{91240B29-F687-4f45-9708-019B960494DF}">
-                <a14:hiddenLine xmlns:a14="http://schemas.microsoft.com/office/drawing/2010/main" xmlns="" w="9525">
+                <a14:hiddenLine xmlns="" xmlns:a14="http://schemas.microsoft.com/office/drawing/2010/main" w="9525">
                   <a:solidFill>
                     <a:srgbClr val="000000"/>
                   </a:solidFill>
@@ -967,7 +966,7 @@
             </a:ln>
             <a:extLst>
               <a:ext uri="{91240B29-F687-4f45-9708-019B960494DF}">
-                <a14:hiddenLine xmlns:a14="http://schemas.microsoft.com/office/drawing/2010/main" xmlns="" w="9525">
+                <a14:hiddenLine xmlns="" xmlns:a14="http://schemas.microsoft.com/office/drawing/2010/main" w="9525">
                   <a:solidFill>
                     <a:srgbClr val="000000"/>
                   </a:solidFill>
@@ -1057,7 +1056,7 @@
             </a:ln>
             <a:extLst>
               <a:ext uri="{91240B29-F687-4f45-9708-019B960494DF}">
-                <a14:hiddenLine xmlns:a14="http://schemas.microsoft.com/office/drawing/2010/main" xmlns="" w="9525">
+                <a14:hiddenLine xmlns="" xmlns:a14="http://schemas.microsoft.com/office/drawing/2010/main" w="9525">
                   <a:solidFill>
                     <a:srgbClr val="000000"/>
                   </a:solidFill>
@@ -1119,7 +1118,7 @@
             </a:ln>
             <a:extLst>
               <a:ext uri="{91240B29-F687-4f45-9708-019B960494DF}">
-                <a14:hiddenLine xmlns:a14="http://schemas.microsoft.com/office/drawing/2010/main" xmlns="" w="9525">
+                <a14:hiddenLine xmlns="" xmlns:a14="http://schemas.microsoft.com/office/drawing/2010/main" w="9525">
                   <a:solidFill>
                     <a:srgbClr val="000000"/>
                   </a:solidFill>
@@ -1229,7 +1228,7 @@
             </a:ln>
             <a:extLst>
               <a:ext uri="{91240B29-F687-4f45-9708-019B960494DF}">
-                <a14:hiddenLine xmlns:a14="http://schemas.microsoft.com/office/drawing/2010/main" xmlns="" w="9525">
+                <a14:hiddenLine xmlns="" xmlns:a14="http://schemas.microsoft.com/office/drawing/2010/main" w="9525">
                   <a:solidFill>
                     <a:srgbClr val="000000"/>
                   </a:solidFill>
@@ -1291,7 +1290,7 @@
             </a:ln>
             <a:extLst>
               <a:ext uri="{91240B29-F687-4f45-9708-019B960494DF}">
-                <a14:hiddenLine xmlns:a14="http://schemas.microsoft.com/office/drawing/2010/main" xmlns="" w="9525">
+                <a14:hiddenLine xmlns="" xmlns:a14="http://schemas.microsoft.com/office/drawing/2010/main" w="9525">
                   <a:solidFill>
                     <a:srgbClr val="000000"/>
                   </a:solidFill>
@@ -1381,7 +1380,7 @@
             </a:ln>
             <a:extLst>
               <a:ext uri="{91240B29-F687-4f45-9708-019B960494DF}">
-                <a14:hiddenLine xmlns:a14="http://schemas.microsoft.com/office/drawing/2010/main" xmlns="" w="9525">
+                <a14:hiddenLine xmlns="" xmlns:a14="http://schemas.microsoft.com/office/drawing/2010/main" w="9525">
                   <a:solidFill>
                     <a:srgbClr val="000000"/>
                   </a:solidFill>
@@ -1471,7 +1470,7 @@
             </a:ln>
             <a:extLst>
               <a:ext uri="{91240B29-F687-4f45-9708-019B960494DF}">
-                <a14:hiddenLine xmlns:a14="http://schemas.microsoft.com/office/drawing/2010/main" xmlns="" w="9525">
+                <a14:hiddenLine xmlns="" xmlns:a14="http://schemas.microsoft.com/office/drawing/2010/main" w="9525">
                   <a:solidFill>
                     <a:srgbClr val="000000"/>
                   </a:solidFill>
@@ -1533,7 +1532,7 @@
             </a:ln>
             <a:extLst>
               <a:ext uri="{91240B29-F687-4f45-9708-019B960494DF}">
-                <a14:hiddenLine xmlns:a14="http://schemas.microsoft.com/office/drawing/2010/main" xmlns="" w="9525">
+                <a14:hiddenLine xmlns="" xmlns:a14="http://schemas.microsoft.com/office/drawing/2010/main" w="9525">
                   <a:solidFill>
                     <a:srgbClr val="000000"/>
                   </a:solidFill>
@@ -1623,7 +1622,7 @@
             </a:ln>
             <a:extLst>
               <a:ext uri="{91240B29-F687-4f45-9708-019B960494DF}">
-                <a14:hiddenLine xmlns:a14="http://schemas.microsoft.com/office/drawing/2010/main" xmlns="" w="9525">
+                <a14:hiddenLine xmlns="" xmlns:a14="http://schemas.microsoft.com/office/drawing/2010/main" w="9525">
                   <a:solidFill>
                     <a:srgbClr val="000000"/>
                   </a:solidFill>
@@ -1713,7 +1712,7 @@
             </a:ln>
             <a:extLst>
               <a:ext uri="{91240B29-F687-4f45-9708-019B960494DF}">
-                <a14:hiddenLine xmlns:a14="http://schemas.microsoft.com/office/drawing/2010/main" xmlns="" w="9525">
+                <a14:hiddenLine xmlns="" xmlns:a14="http://schemas.microsoft.com/office/drawing/2010/main" w="9525">
                   <a:solidFill>
                     <a:srgbClr val="000000"/>
                   </a:solidFill>
@@ -1769,7 +1768,7 @@
             </a:ln>
             <a:extLst>
               <a:ext uri="{91240B29-F687-4f45-9708-019B960494DF}">
-                <a14:hiddenLine xmlns:a14="http://schemas.microsoft.com/office/drawing/2010/main" xmlns="" w="9525">
+                <a14:hiddenLine xmlns="" xmlns:a14="http://schemas.microsoft.com/office/drawing/2010/main" w="9525">
                   <a:solidFill>
                     <a:srgbClr val="000000"/>
                   </a:solidFill>
@@ -1859,7 +1858,7 @@
             </a:ln>
             <a:extLst>
               <a:ext uri="{91240B29-F687-4f45-9708-019B960494DF}">
-                <a14:hiddenLine xmlns:a14="http://schemas.microsoft.com/office/drawing/2010/main" xmlns="" w="9525">
+                <a14:hiddenLine xmlns="" xmlns:a14="http://schemas.microsoft.com/office/drawing/2010/main" w="9525">
                   <a:solidFill>
                     <a:srgbClr val="000000"/>
                   </a:solidFill>
@@ -1915,7 +1914,7 @@
             </a:ln>
             <a:extLst>
               <a:ext uri="{91240B29-F687-4f45-9708-019B960494DF}">
-                <a14:hiddenLine xmlns:a14="http://schemas.microsoft.com/office/drawing/2010/main" xmlns="" w="9525">
+                <a14:hiddenLine xmlns="" xmlns:a14="http://schemas.microsoft.com/office/drawing/2010/main" w="9525">
                   <a:solidFill>
                     <a:srgbClr val="000000"/>
                   </a:solidFill>
@@ -2005,7 +2004,7 @@
             </a:ln>
             <a:extLst>
               <a:ext uri="{91240B29-F687-4f45-9708-019B960494DF}">
-                <a14:hiddenLine xmlns:a14="http://schemas.microsoft.com/office/drawing/2010/main" xmlns="" w="9525">
+                <a14:hiddenLine xmlns="" xmlns:a14="http://schemas.microsoft.com/office/drawing/2010/main" w="9525">
                   <a:solidFill>
                     <a:srgbClr val="000000"/>
                   </a:solidFill>
@@ -2073,7 +2072,7 @@
             </a:ln>
             <a:extLst>
               <a:ext uri="{91240B29-F687-4f45-9708-019B960494DF}">
-                <a14:hiddenLine xmlns:a14="http://schemas.microsoft.com/office/drawing/2010/main" xmlns="" w="9525">
+                <a14:hiddenLine xmlns="" xmlns:a14="http://schemas.microsoft.com/office/drawing/2010/main" w="9525">
                   <a:solidFill>
                     <a:srgbClr val="000000"/>
                   </a:solidFill>
@@ -2163,7 +2162,7 @@
             </a:ln>
             <a:extLst>
               <a:ext uri="{91240B29-F687-4f45-9708-019B960494DF}">
-                <a14:hiddenLine xmlns:a14="http://schemas.microsoft.com/office/drawing/2010/main" xmlns="" w="9525">
+                <a14:hiddenLine xmlns="" xmlns:a14="http://schemas.microsoft.com/office/drawing/2010/main" w="9525">
                   <a:solidFill>
                     <a:srgbClr val="000000"/>
                   </a:solidFill>
@@ -2231,7 +2230,7 @@
             </a:ln>
             <a:extLst>
               <a:ext uri="{91240B29-F687-4f45-9708-019B960494DF}">
-                <a14:hiddenLine xmlns:a14="http://schemas.microsoft.com/office/drawing/2010/main" xmlns="" w="9525">
+                <a14:hiddenLine xmlns="" xmlns:a14="http://schemas.microsoft.com/office/drawing/2010/main" w="9525">
                   <a:solidFill>
                     <a:srgbClr val="000000"/>
                   </a:solidFill>
@@ -2321,7 +2320,7 @@
             </a:ln>
             <a:extLst>
               <a:ext uri="{91240B29-F687-4f45-9708-019B960494DF}">
-                <a14:hiddenLine xmlns:a14="http://schemas.microsoft.com/office/drawing/2010/main" xmlns="" w="9525">
+                <a14:hiddenLine xmlns="" xmlns:a14="http://schemas.microsoft.com/office/drawing/2010/main" w="9525">
                   <a:solidFill>
                     <a:srgbClr val="000000"/>
                   </a:solidFill>
@@ -2355,7 +2354,7 @@
             </a:ln>
             <a:extLst>
               <a:ext uri="{91240B29-F687-4f45-9708-019B960494DF}">
-                <a14:hiddenLine xmlns:a14="http://schemas.microsoft.com/office/drawing/2010/main" xmlns="" w="9525">
+                <a14:hiddenLine xmlns="" xmlns:a14="http://schemas.microsoft.com/office/drawing/2010/main" w="9525">
                   <a:solidFill>
                     <a:srgbClr val="000000"/>
                   </a:solidFill>
@@ -2445,7 +2444,7 @@
             </a:ln>
             <a:extLst>
               <a:ext uri="{91240B29-F687-4f45-9708-019B960494DF}">
-                <a14:hiddenLine xmlns:a14="http://schemas.microsoft.com/office/drawing/2010/main" xmlns="" w="9525">
+                <a14:hiddenLine xmlns="" xmlns:a14="http://schemas.microsoft.com/office/drawing/2010/main" w="9525">
                   <a:solidFill>
                     <a:srgbClr val="000000"/>
                   </a:solidFill>
@@ -2507,7 +2506,7 @@
             </a:ln>
             <a:extLst>
               <a:ext uri="{91240B29-F687-4f45-9708-019B960494DF}">
-                <a14:hiddenLine xmlns:a14="http://schemas.microsoft.com/office/drawing/2010/main" xmlns="" w="9525">
+                <a14:hiddenLine xmlns="" xmlns:a14="http://schemas.microsoft.com/office/drawing/2010/main" w="9525">
                   <a:solidFill>
                     <a:srgbClr val="000000"/>
                   </a:solidFill>
@@ -2569,7 +2568,7 @@
             </a:ln>
             <a:extLst>
               <a:ext uri="{91240B29-F687-4f45-9708-019B960494DF}">
-                <a14:hiddenLine xmlns:a14="http://schemas.microsoft.com/office/drawing/2010/main" xmlns="" w="9525">
+                <a14:hiddenLine xmlns="" xmlns:a14="http://schemas.microsoft.com/office/drawing/2010/main" w="9525">
                   <a:solidFill>
                     <a:srgbClr val="000000"/>
                   </a:solidFill>
@@ -2659,7 +2658,7 @@
             </a:ln>
             <a:extLst>
               <a:ext uri="{91240B29-F687-4f45-9708-019B960494DF}">
-                <a14:hiddenLine xmlns:a14="http://schemas.microsoft.com/office/drawing/2010/main" xmlns="" w="9525">
+                <a14:hiddenLine xmlns="" xmlns:a14="http://schemas.microsoft.com/office/drawing/2010/main" w="9525">
                   <a:solidFill>
                     <a:srgbClr val="000000"/>
                   </a:solidFill>
@@ -2727,7 +2726,7 @@
             </a:ln>
             <a:extLst>
               <a:ext uri="{91240B29-F687-4f45-9708-019B960494DF}">
-                <a14:hiddenLine xmlns:a14="http://schemas.microsoft.com/office/drawing/2010/main" xmlns="" w="9525">
+                <a14:hiddenLine xmlns="" xmlns:a14="http://schemas.microsoft.com/office/drawing/2010/main" w="9525">
                   <a:solidFill>
                     <a:srgbClr val="000000"/>
                   </a:solidFill>
@@ -2789,7 +2788,7 @@
             </a:ln>
             <a:extLst>
               <a:ext uri="{91240B29-F687-4f45-9708-019B960494DF}">
-                <a14:hiddenLine xmlns:a14="http://schemas.microsoft.com/office/drawing/2010/main" xmlns="" w="9525">
+                <a14:hiddenLine xmlns="" xmlns:a14="http://schemas.microsoft.com/office/drawing/2010/main" w="9525">
                   <a:solidFill>
                     <a:srgbClr val="000000"/>
                   </a:solidFill>
@@ -2879,7 +2878,7 @@
             </a:ln>
             <a:extLst>
               <a:ext uri="{91240B29-F687-4f45-9708-019B960494DF}">
-                <a14:hiddenLine xmlns:a14="http://schemas.microsoft.com/office/drawing/2010/main" xmlns="" w="9525">
+                <a14:hiddenLine xmlns="" xmlns:a14="http://schemas.microsoft.com/office/drawing/2010/main" w="9525">
                   <a:solidFill>
                     <a:srgbClr val="000000"/>
                   </a:solidFill>
@@ -2941,7 +2940,7 @@
             </a:ln>
             <a:extLst>
               <a:ext uri="{91240B29-F687-4f45-9708-019B960494DF}">
-                <a14:hiddenLine xmlns:a14="http://schemas.microsoft.com/office/drawing/2010/main" xmlns="" w="9525">
+                <a14:hiddenLine xmlns="" xmlns:a14="http://schemas.microsoft.com/office/drawing/2010/main" w="9525">
                   <a:solidFill>
                     <a:srgbClr val="000000"/>
                   </a:solidFill>
@@ -3031,7 +3030,7 @@
             </a:ln>
             <a:extLst>
               <a:ext uri="{91240B29-F687-4f45-9708-019B960494DF}">
-                <a14:hiddenLine xmlns:a14="http://schemas.microsoft.com/office/drawing/2010/main" xmlns="" w="9525">
+                <a14:hiddenLine xmlns="" xmlns:a14="http://schemas.microsoft.com/office/drawing/2010/main" w="9525">
                   <a:solidFill>
                     <a:srgbClr val="000000"/>
                   </a:solidFill>
@@ -3093,7 +3092,7 @@
             </a:ln>
             <a:extLst>
               <a:ext uri="{91240B29-F687-4f45-9708-019B960494DF}">
-                <a14:hiddenLine xmlns:a14="http://schemas.microsoft.com/office/drawing/2010/main" xmlns="" w="9525">
+                <a14:hiddenLine xmlns="" xmlns:a14="http://schemas.microsoft.com/office/drawing/2010/main" w="9525">
                   <a:solidFill>
                     <a:srgbClr val="000000"/>
                   </a:solidFill>
@@ -3183,7 +3182,7 @@
             </a:ln>
             <a:extLst>
               <a:ext uri="{91240B29-F687-4f45-9708-019B960494DF}">
-                <a14:hiddenLine xmlns:a14="http://schemas.microsoft.com/office/drawing/2010/main" xmlns="" w="9525">
+                <a14:hiddenLine xmlns="" xmlns:a14="http://schemas.microsoft.com/office/drawing/2010/main" w="9525">
                   <a:solidFill>
                     <a:srgbClr val="000000"/>
                   </a:solidFill>
@@ -3217,7 +3216,7 @@
             </a:ln>
             <a:extLst>
               <a:ext uri="{91240B29-F687-4f45-9708-019B960494DF}">
-                <a14:hiddenLine xmlns:a14="http://schemas.microsoft.com/office/drawing/2010/main" xmlns="" w="9525">
+                <a14:hiddenLine xmlns="" xmlns:a14="http://schemas.microsoft.com/office/drawing/2010/main" w="9525">
                   <a:solidFill>
                     <a:srgbClr val="000000"/>
                   </a:solidFill>
@@ -3282,7 +3281,7 @@
             </a:ln>
             <a:extLst>
               <a:ext uri="{91240B29-F687-4f45-9708-019B960494DF}">
-                <a14:hiddenLine xmlns:a14="http://schemas.microsoft.com/office/drawing/2010/main" xmlns="" w="9525">
+                <a14:hiddenLine xmlns="" xmlns:a14="http://schemas.microsoft.com/office/drawing/2010/main" w="9525">
                   <a:solidFill>
                     <a:srgbClr val="000000"/>
                   </a:solidFill>
@@ -3372,7 +3371,7 @@
             </a:ln>
             <a:extLst>
               <a:ext uri="{91240B29-F687-4f45-9708-019B960494DF}">
-                <a14:hiddenLine xmlns:a14="http://schemas.microsoft.com/office/drawing/2010/main" xmlns="" w="9525">
+                <a14:hiddenLine xmlns="" xmlns:a14="http://schemas.microsoft.com/office/drawing/2010/main" w="9525">
                   <a:solidFill>
                     <a:srgbClr val="000000"/>
                   </a:solidFill>
@@ -3434,7 +3433,7 @@
             </a:ln>
             <a:extLst>
               <a:ext uri="{91240B29-F687-4f45-9708-019B960494DF}">
-                <a14:hiddenLine xmlns:a14="http://schemas.microsoft.com/office/drawing/2010/main" xmlns="" w="9525">
+                <a14:hiddenLine xmlns="" xmlns:a14="http://schemas.microsoft.com/office/drawing/2010/main" w="9525">
                   <a:solidFill>
                     <a:srgbClr val="000000"/>
                   </a:solidFill>
@@ -3524,7 +3523,7 @@
             </a:ln>
             <a:extLst>
               <a:ext uri="{91240B29-F687-4f45-9708-019B960494DF}">
-                <a14:hiddenLine xmlns:a14="http://schemas.microsoft.com/office/drawing/2010/main" xmlns="" w="9525">
+                <a14:hiddenLine xmlns="" xmlns:a14="http://schemas.microsoft.com/office/drawing/2010/main" w="9525">
                   <a:solidFill>
                     <a:srgbClr val="000000"/>
                   </a:solidFill>
@@ -3614,7 +3613,7 @@
             </a:ln>
             <a:extLst>
               <a:ext uri="{91240B29-F687-4f45-9708-019B960494DF}">
-                <a14:hiddenLine xmlns:a14="http://schemas.microsoft.com/office/drawing/2010/main" xmlns="" w="9525">
+                <a14:hiddenLine xmlns="" xmlns:a14="http://schemas.microsoft.com/office/drawing/2010/main" w="9525">
                   <a:solidFill>
                     <a:srgbClr val="000000"/>
                   </a:solidFill>
@@ -3679,7 +3678,7 @@
             </a:ln>
             <a:extLst>
               <a:ext uri="{91240B29-F687-4f45-9708-019B960494DF}">
-                <a14:hiddenLine xmlns:a14="http://schemas.microsoft.com/office/drawing/2010/main" xmlns="" w="9525">
+                <a14:hiddenLine xmlns="" xmlns:a14="http://schemas.microsoft.com/office/drawing/2010/main" w="9525">
                   <a:solidFill>
                     <a:srgbClr val="000000"/>
                   </a:solidFill>
@@ -3741,7 +3740,7 @@
             </a:ln>
             <a:extLst>
               <a:ext uri="{91240B29-F687-4f45-9708-019B960494DF}">
-                <a14:hiddenLine xmlns:a14="http://schemas.microsoft.com/office/drawing/2010/main" xmlns="" w="9525">
+                <a14:hiddenLine xmlns="" xmlns:a14="http://schemas.microsoft.com/office/drawing/2010/main" w="9525">
                   <a:solidFill>
                     <a:srgbClr val="000000"/>
                   </a:solidFill>
@@ -3831,7 +3830,7 @@
             </a:ln>
             <a:extLst>
               <a:ext uri="{91240B29-F687-4f45-9708-019B960494DF}">
-                <a14:hiddenLine xmlns:a14="http://schemas.microsoft.com/office/drawing/2010/main" xmlns="" w="9525">
+                <a14:hiddenLine xmlns="" xmlns:a14="http://schemas.microsoft.com/office/drawing/2010/main" w="9525">
                   <a:solidFill>
                     <a:srgbClr val="000000"/>
                   </a:solidFill>
@@ -3921,7 +3920,7 @@
             </a:ln>
             <a:extLst>
               <a:ext uri="{91240B29-F687-4f45-9708-019B960494DF}">
-                <a14:hiddenLine xmlns:a14="http://schemas.microsoft.com/office/drawing/2010/main" xmlns="" w="9525">
+                <a14:hiddenLine xmlns="" xmlns:a14="http://schemas.microsoft.com/office/drawing/2010/main" w="9525">
                   <a:solidFill>
                     <a:srgbClr val="000000"/>
                   </a:solidFill>
@@ -3983,7 +3982,7 @@
             </a:ln>
             <a:extLst>
               <a:ext uri="{91240B29-F687-4f45-9708-019B960494DF}">
-                <a14:hiddenLine xmlns:a14="http://schemas.microsoft.com/office/drawing/2010/main" xmlns="" w="9525">
+                <a14:hiddenLine xmlns="" xmlns:a14="http://schemas.microsoft.com/office/drawing/2010/main" w="9525">
                   <a:solidFill>
                     <a:srgbClr val="000000"/>
                   </a:solidFill>
@@ -4103,7 +4102,7 @@
             </a:ln>
             <a:extLst>
               <a:ext uri="{91240B29-F687-4f45-9708-019B960494DF}">
-                <a14:hiddenLine xmlns:a14="http://schemas.microsoft.com/office/drawing/2010/main" xmlns="" w="9525">
+                <a14:hiddenLine xmlns="" xmlns:a14="http://schemas.microsoft.com/office/drawing/2010/main" w="9525">
                   <a:solidFill>
                     <a:srgbClr val="000000"/>
                   </a:solidFill>
@@ -4171,7 +4170,7 @@
             </a:ln>
             <a:extLst>
               <a:ext uri="{91240B29-F687-4f45-9708-019B960494DF}">
-                <a14:hiddenLine xmlns:a14="http://schemas.microsoft.com/office/drawing/2010/main" xmlns="" w="9525">
+                <a14:hiddenLine xmlns="" xmlns:a14="http://schemas.microsoft.com/office/drawing/2010/main" w="9525">
                   <a:solidFill>
                     <a:srgbClr val="000000"/>
                   </a:solidFill>
@@ -4261,7 +4260,7 @@
             </a:ln>
             <a:extLst>
               <a:ext uri="{91240B29-F687-4f45-9708-019B960494DF}">
-                <a14:hiddenLine xmlns:a14="http://schemas.microsoft.com/office/drawing/2010/main" xmlns="" w="9525">
+                <a14:hiddenLine xmlns="" xmlns:a14="http://schemas.microsoft.com/office/drawing/2010/main" w="9525">
                   <a:solidFill>
                     <a:srgbClr val="000000"/>
                   </a:solidFill>
@@ -9305,7 +9304,7 @@
           <a:noFill/>
           <a:extLst>
             <a:ext uri="{909E8E84-426E-40dd-AFC4-6F175D3DCCD1}">
-              <a14:hiddenFill xmlns:a14="http://schemas.microsoft.com/office/drawing/2010/main" xmlns="">
+              <a14:hiddenFill xmlns="" xmlns:a14="http://schemas.microsoft.com/office/drawing/2010/main">
                 <a:solidFill>
                   <a:srgbClr val="FFFFFF"/>
                 </a:solidFill>
@@ -9379,7 +9378,7 @@
               </a:ln>
               <a:extLst>
                 <a:ext uri="{91240B29-F687-4f45-9708-019B960494DF}">
-                  <a14:hiddenLine xmlns:a14="http://schemas.microsoft.com/office/drawing/2010/main" xmlns="" w="9525">
+                  <a14:hiddenLine xmlns="" xmlns:a14="http://schemas.microsoft.com/office/drawing/2010/main" w="9525">
                     <a:solidFill>
                       <a:srgbClr val="000000"/>
                     </a:solidFill>
@@ -9469,7 +9468,7 @@
               </a:ln>
               <a:extLst>
                 <a:ext uri="{91240B29-F687-4f45-9708-019B960494DF}">
-                  <a14:hiddenLine xmlns:a14="http://schemas.microsoft.com/office/drawing/2010/main" xmlns="" w="9525">
+                  <a14:hiddenLine xmlns="" xmlns:a14="http://schemas.microsoft.com/office/drawing/2010/main" w="9525">
                     <a:solidFill>
                       <a:srgbClr val="000000"/>
                     </a:solidFill>
@@ -9559,7 +9558,7 @@
               </a:ln>
               <a:extLst>
                 <a:ext uri="{91240B29-F687-4f45-9708-019B960494DF}">
-                  <a14:hiddenLine xmlns:a14="http://schemas.microsoft.com/office/drawing/2010/main" xmlns="" w="9525">
+                  <a14:hiddenLine xmlns="" xmlns:a14="http://schemas.microsoft.com/office/drawing/2010/main" w="9525">
                     <a:solidFill>
                       <a:srgbClr val="000000"/>
                     </a:solidFill>
@@ -9621,7 +9620,7 @@
               </a:ln>
               <a:extLst>
                 <a:ext uri="{91240B29-F687-4f45-9708-019B960494DF}">
-                  <a14:hiddenLine xmlns:a14="http://schemas.microsoft.com/office/drawing/2010/main" xmlns="" w="9525">
+                  <a14:hiddenLine xmlns="" xmlns:a14="http://schemas.microsoft.com/office/drawing/2010/main" w="9525">
                     <a:solidFill>
                       <a:srgbClr val="000000"/>
                     </a:solidFill>
@@ -9711,7 +9710,7 @@
               </a:ln>
               <a:extLst>
                 <a:ext uri="{91240B29-F687-4f45-9708-019B960494DF}">
-                  <a14:hiddenLine xmlns:a14="http://schemas.microsoft.com/office/drawing/2010/main" xmlns="" w="9525">
+                  <a14:hiddenLine xmlns="" xmlns:a14="http://schemas.microsoft.com/office/drawing/2010/main" w="9525">
                     <a:solidFill>
                       <a:srgbClr val="000000"/>
                     </a:solidFill>
@@ -9773,7 +9772,7 @@
               </a:ln>
               <a:extLst>
                 <a:ext uri="{91240B29-F687-4f45-9708-019B960494DF}">
-                  <a14:hiddenLine xmlns:a14="http://schemas.microsoft.com/office/drawing/2010/main" xmlns="" w="9525">
+                  <a14:hiddenLine xmlns="" xmlns:a14="http://schemas.microsoft.com/office/drawing/2010/main" w="9525">
                     <a:solidFill>
                       <a:srgbClr val="000000"/>
                     </a:solidFill>
@@ -9835,7 +9834,7 @@
               </a:ln>
               <a:extLst>
                 <a:ext uri="{91240B29-F687-4f45-9708-019B960494DF}">
-                  <a14:hiddenLine xmlns:a14="http://schemas.microsoft.com/office/drawing/2010/main" xmlns="" w="9525">
+                  <a14:hiddenLine xmlns="" xmlns:a14="http://schemas.microsoft.com/office/drawing/2010/main" w="9525">
                     <a:solidFill>
                       <a:srgbClr val="000000"/>
                     </a:solidFill>
@@ -9925,7 +9924,7 @@
               </a:ln>
               <a:extLst>
                 <a:ext uri="{91240B29-F687-4f45-9708-019B960494DF}">
-                  <a14:hiddenLine xmlns:a14="http://schemas.microsoft.com/office/drawing/2010/main" xmlns="" w="9525">
+                  <a14:hiddenLine xmlns="" xmlns:a14="http://schemas.microsoft.com/office/drawing/2010/main" w="9525">
                     <a:solidFill>
                       <a:srgbClr val="000000"/>
                     </a:solidFill>
@@ -10015,7 +10014,7 @@
               </a:ln>
               <a:extLst>
                 <a:ext uri="{91240B29-F687-4f45-9708-019B960494DF}">
-                  <a14:hiddenLine xmlns:a14="http://schemas.microsoft.com/office/drawing/2010/main" xmlns="" w="9525">
+                  <a14:hiddenLine xmlns="" xmlns:a14="http://schemas.microsoft.com/office/drawing/2010/main" w="9525">
                     <a:solidFill>
                       <a:srgbClr val="000000"/>
                     </a:solidFill>
@@ -10077,7 +10076,7 @@
               </a:ln>
               <a:extLst>
                 <a:ext uri="{91240B29-F687-4f45-9708-019B960494DF}">
-                  <a14:hiddenLine xmlns:a14="http://schemas.microsoft.com/office/drawing/2010/main" xmlns="" w="9525">
+                  <a14:hiddenLine xmlns="" xmlns:a14="http://schemas.microsoft.com/office/drawing/2010/main" w="9525">
                     <a:solidFill>
                       <a:srgbClr val="000000"/>
                     </a:solidFill>
@@ -10187,7 +10186,7 @@
               </a:ln>
               <a:extLst>
                 <a:ext uri="{91240B29-F687-4f45-9708-019B960494DF}">
-                  <a14:hiddenLine xmlns:a14="http://schemas.microsoft.com/office/drawing/2010/main" xmlns="" w="9525">
+                  <a14:hiddenLine xmlns="" xmlns:a14="http://schemas.microsoft.com/office/drawing/2010/main" w="9525">
                     <a:solidFill>
                       <a:srgbClr val="000000"/>
                     </a:solidFill>
@@ -10271,7 +10270,7 @@
               </a:ln>
               <a:extLst>
                 <a:ext uri="{91240B29-F687-4f45-9708-019B960494DF}">
-                  <a14:hiddenLine xmlns:a14="http://schemas.microsoft.com/office/drawing/2010/main" xmlns="" w="9525">
+                  <a14:hiddenLine xmlns="" xmlns:a14="http://schemas.microsoft.com/office/drawing/2010/main" w="9525">
                     <a:solidFill>
                       <a:srgbClr val="000000"/>
                     </a:solidFill>
@@ -10333,7 +10332,7 @@
               </a:ln>
               <a:extLst>
                 <a:ext uri="{91240B29-F687-4f45-9708-019B960494DF}">
-                  <a14:hiddenLine xmlns:a14="http://schemas.microsoft.com/office/drawing/2010/main" xmlns="" w="9525">
+                  <a14:hiddenLine xmlns="" xmlns:a14="http://schemas.microsoft.com/office/drawing/2010/main" w="9525">
                     <a:solidFill>
                       <a:srgbClr val="000000"/>
                     </a:solidFill>
@@ -10395,7 +10394,7 @@
               </a:ln>
               <a:extLst>
                 <a:ext uri="{91240B29-F687-4f45-9708-019B960494DF}">
-                  <a14:hiddenLine xmlns:a14="http://schemas.microsoft.com/office/drawing/2010/main" xmlns="" w="9525">
+                  <a14:hiddenLine xmlns="" xmlns:a14="http://schemas.microsoft.com/office/drawing/2010/main" w="9525">
                     <a:solidFill>
                       <a:srgbClr val="000000"/>
                     </a:solidFill>
@@ -10485,7 +10484,7 @@
               </a:ln>
               <a:extLst>
                 <a:ext uri="{91240B29-F687-4f45-9708-019B960494DF}">
-                  <a14:hiddenLine xmlns:a14="http://schemas.microsoft.com/office/drawing/2010/main" xmlns="" w="9525">
+                  <a14:hiddenLine xmlns="" xmlns:a14="http://schemas.microsoft.com/office/drawing/2010/main" w="9525">
                     <a:solidFill>
                       <a:srgbClr val="000000"/>
                     </a:solidFill>
@@ -10519,7 +10518,7 @@
               </a:ln>
               <a:extLst>
                 <a:ext uri="{91240B29-F687-4f45-9708-019B960494DF}">
-                  <a14:hiddenLine xmlns:a14="http://schemas.microsoft.com/office/drawing/2010/main" xmlns="" w="9525">
+                  <a14:hiddenLine xmlns="" xmlns:a14="http://schemas.microsoft.com/office/drawing/2010/main" w="9525">
                     <a:solidFill>
                       <a:srgbClr val="000000"/>
                     </a:solidFill>
@@ -10584,7 +10583,7 @@
               </a:ln>
               <a:extLst>
                 <a:ext uri="{91240B29-F687-4f45-9708-019B960494DF}">
-                  <a14:hiddenLine xmlns:a14="http://schemas.microsoft.com/office/drawing/2010/main" xmlns="" w="9525">
+                  <a14:hiddenLine xmlns="" xmlns:a14="http://schemas.microsoft.com/office/drawing/2010/main" w="9525">
                     <a:solidFill>
                       <a:srgbClr val="000000"/>
                     </a:solidFill>
@@ -10674,7 +10673,7 @@
               </a:ln>
               <a:extLst>
                 <a:ext uri="{91240B29-F687-4f45-9708-019B960494DF}">
-                  <a14:hiddenLine xmlns:a14="http://schemas.microsoft.com/office/drawing/2010/main" xmlns="" w="9525">
+                  <a14:hiddenLine xmlns="" xmlns:a14="http://schemas.microsoft.com/office/drawing/2010/main" w="9525">
                     <a:solidFill>
                       <a:srgbClr val="000000"/>
                     </a:solidFill>
@@ -10736,7 +10735,7 @@
               </a:ln>
               <a:extLst>
                 <a:ext uri="{91240B29-F687-4f45-9708-019B960494DF}">
-                  <a14:hiddenLine xmlns:a14="http://schemas.microsoft.com/office/drawing/2010/main" xmlns="" w="9525">
+                  <a14:hiddenLine xmlns="" xmlns:a14="http://schemas.microsoft.com/office/drawing/2010/main" w="9525">
                     <a:solidFill>
                       <a:srgbClr val="000000"/>
                     </a:solidFill>
@@ -10826,7 +10825,7 @@
               </a:ln>
               <a:extLst>
                 <a:ext uri="{91240B29-F687-4f45-9708-019B960494DF}">
-                  <a14:hiddenLine xmlns:a14="http://schemas.microsoft.com/office/drawing/2010/main" xmlns="" w="9525">
+                  <a14:hiddenLine xmlns="" xmlns:a14="http://schemas.microsoft.com/office/drawing/2010/main" w="9525">
                     <a:solidFill>
                       <a:srgbClr val="000000"/>
                     </a:solidFill>
@@ -10891,7 +10890,7 @@
               </a:ln>
               <a:extLst>
                 <a:ext uri="{91240B29-F687-4f45-9708-019B960494DF}">
-                  <a14:hiddenLine xmlns:a14="http://schemas.microsoft.com/office/drawing/2010/main" xmlns="" w="9525">
+                  <a14:hiddenLine xmlns="" xmlns:a14="http://schemas.microsoft.com/office/drawing/2010/main" w="9525">
                     <a:solidFill>
                       <a:srgbClr val="000000"/>
                     </a:solidFill>
@@ -10953,7 +10952,7 @@
               </a:ln>
               <a:extLst>
                 <a:ext uri="{91240B29-F687-4f45-9708-019B960494DF}">
-                  <a14:hiddenLine xmlns:a14="http://schemas.microsoft.com/office/drawing/2010/main" xmlns="" w="9525">
+                  <a14:hiddenLine xmlns="" xmlns:a14="http://schemas.microsoft.com/office/drawing/2010/main" w="9525">
                     <a:solidFill>
                       <a:srgbClr val="000000"/>
                     </a:solidFill>
@@ -11043,7 +11042,7 @@
               </a:ln>
               <a:extLst>
                 <a:ext uri="{91240B29-F687-4f45-9708-019B960494DF}">
-                  <a14:hiddenLine xmlns:a14="http://schemas.microsoft.com/office/drawing/2010/main" xmlns="" w="9525">
+                  <a14:hiddenLine xmlns="" xmlns:a14="http://schemas.microsoft.com/office/drawing/2010/main" w="9525">
                     <a:solidFill>
                       <a:srgbClr val="000000"/>
                     </a:solidFill>
@@ -11133,7 +11132,7 @@
               </a:ln>
               <a:extLst>
                 <a:ext uri="{91240B29-F687-4f45-9708-019B960494DF}">
-                  <a14:hiddenLine xmlns:a14="http://schemas.microsoft.com/office/drawing/2010/main" xmlns="" w="9525">
+                  <a14:hiddenLine xmlns="" xmlns:a14="http://schemas.microsoft.com/office/drawing/2010/main" w="9525">
                     <a:solidFill>
                       <a:srgbClr val="000000"/>
                     </a:solidFill>
@@ -11198,7 +11197,7 @@
               </a:ln>
               <a:extLst>
                 <a:ext uri="{91240B29-F687-4f45-9708-019B960494DF}">
-                  <a14:hiddenLine xmlns:a14="http://schemas.microsoft.com/office/drawing/2010/main" xmlns="" w="9525">
+                  <a14:hiddenLine xmlns="" xmlns:a14="http://schemas.microsoft.com/office/drawing/2010/main" w="9525">
                     <a:solidFill>
                       <a:srgbClr val="000000"/>
                     </a:solidFill>
@@ -11318,7 +11317,7 @@
               </a:ln>
               <a:extLst>
                 <a:ext uri="{91240B29-F687-4f45-9708-019B960494DF}">
-                  <a14:hiddenLine xmlns:a14="http://schemas.microsoft.com/office/drawing/2010/main" xmlns="" w="9525">
+                  <a14:hiddenLine xmlns="" xmlns:a14="http://schemas.microsoft.com/office/drawing/2010/main" w="9525">
                     <a:solidFill>
                       <a:srgbClr val="000000"/>
                     </a:solidFill>
@@ -11416,7 +11415,7 @@
               </a:ln>
               <a:extLst>
                 <a:ext uri="{91240B29-F687-4f45-9708-019B960494DF}">
-                  <a14:hiddenLine xmlns:a14="http://schemas.microsoft.com/office/drawing/2010/main" xmlns="" w="9525">
+                  <a14:hiddenLine xmlns="" xmlns:a14="http://schemas.microsoft.com/office/drawing/2010/main" w="9525">
                     <a:solidFill>
                       <a:srgbClr val="000000"/>
                     </a:solidFill>
@@ -11531,7 +11530,7 @@
               </a:ln>
               <a:extLst>
                 <a:ext uri="{91240B29-F687-4f45-9708-019B960494DF}">
-                  <a14:hiddenLine xmlns:a14="http://schemas.microsoft.com/office/drawing/2010/main" xmlns="" w="9525">
+                  <a14:hiddenLine xmlns="" xmlns:a14="http://schemas.microsoft.com/office/drawing/2010/main" w="9525">
                     <a:solidFill>
                       <a:srgbClr val="000000"/>
                     </a:solidFill>
@@ -11621,7 +11620,7 @@
               </a:ln>
               <a:extLst>
                 <a:ext uri="{91240B29-F687-4f45-9708-019B960494DF}">
-                  <a14:hiddenLine xmlns:a14="http://schemas.microsoft.com/office/drawing/2010/main" xmlns="" w="9525">
+                  <a14:hiddenLine xmlns="" xmlns:a14="http://schemas.microsoft.com/office/drawing/2010/main" w="9525">
                     <a:solidFill>
                       <a:srgbClr val="000000"/>
                     </a:solidFill>
@@ -11686,7 +11685,7 @@
               </a:ln>
               <a:extLst>
                 <a:ext uri="{91240B29-F687-4f45-9708-019B960494DF}">
-                  <a14:hiddenLine xmlns:a14="http://schemas.microsoft.com/office/drawing/2010/main" xmlns="" w="9525">
+                  <a14:hiddenLine xmlns="" xmlns:a14="http://schemas.microsoft.com/office/drawing/2010/main" w="9525">
                     <a:solidFill>
                       <a:srgbClr val="000000"/>
                     </a:solidFill>
@@ -11776,7 +11775,7 @@
               </a:ln>
               <a:extLst>
                 <a:ext uri="{91240B29-F687-4f45-9708-019B960494DF}">
-                  <a14:hiddenLine xmlns:a14="http://schemas.microsoft.com/office/drawing/2010/main" xmlns="" w="9525">
+                  <a14:hiddenLine xmlns="" xmlns:a14="http://schemas.microsoft.com/office/drawing/2010/main" w="9525">
                     <a:solidFill>
                       <a:srgbClr val="000000"/>
                     </a:solidFill>
@@ -11844,7 +11843,7 @@
               </a:ln>
               <a:extLst>
                 <a:ext uri="{91240B29-F687-4f45-9708-019B960494DF}">
-                  <a14:hiddenLine xmlns:a14="http://schemas.microsoft.com/office/drawing/2010/main" xmlns="" w="9525">
+                  <a14:hiddenLine xmlns="" xmlns:a14="http://schemas.microsoft.com/office/drawing/2010/main" w="9525">
                     <a:solidFill>
                       <a:srgbClr val="000000"/>
                     </a:solidFill>
@@ -11934,7 +11933,7 @@
               </a:ln>
               <a:extLst>
                 <a:ext uri="{91240B29-F687-4f45-9708-019B960494DF}">
-                  <a14:hiddenLine xmlns:a14="http://schemas.microsoft.com/office/drawing/2010/main" xmlns="" w="9525">
+                  <a14:hiddenLine xmlns="" xmlns:a14="http://schemas.microsoft.com/office/drawing/2010/main" w="9525">
                     <a:solidFill>
                       <a:srgbClr val="000000"/>
                     </a:solidFill>
@@ -12002,7 +12001,7 @@
               </a:ln>
               <a:extLst>
                 <a:ext uri="{91240B29-F687-4f45-9708-019B960494DF}">
-                  <a14:hiddenLine xmlns:a14="http://schemas.microsoft.com/office/drawing/2010/main" xmlns="" w="9525">
+                  <a14:hiddenLine xmlns="" xmlns:a14="http://schemas.microsoft.com/office/drawing/2010/main" w="9525">
                     <a:solidFill>
                       <a:srgbClr val="000000"/>
                     </a:solidFill>
@@ -12092,7 +12091,7 @@
               </a:ln>
               <a:extLst>
                 <a:ext uri="{91240B29-F687-4f45-9708-019B960494DF}">
-                  <a14:hiddenLine xmlns:a14="http://schemas.microsoft.com/office/drawing/2010/main" xmlns="" w="9525">
+                  <a14:hiddenLine xmlns="" xmlns:a14="http://schemas.microsoft.com/office/drawing/2010/main" w="9525">
                     <a:solidFill>
                       <a:srgbClr val="000000"/>
                     </a:solidFill>
@@ -12126,7 +12125,7 @@
               </a:ln>
               <a:extLst>
                 <a:ext uri="{91240B29-F687-4f45-9708-019B960494DF}">
-                  <a14:hiddenLine xmlns:a14="http://schemas.microsoft.com/office/drawing/2010/main" xmlns="" w="9525">
+                  <a14:hiddenLine xmlns="" xmlns:a14="http://schemas.microsoft.com/office/drawing/2010/main" w="9525">
                     <a:solidFill>
                       <a:srgbClr val="000000"/>
                     </a:solidFill>
@@ -13061,7 +13060,7 @@
           <p:cNvPr id="2" name="Title 1">
             <a:extLst>
               <a:ext uri="{FF2B5EF4-FFF2-40B4-BE49-F238E27FC236}">
-                <a16:creationId xmlns:a16="http://schemas.microsoft.com/office/drawing/2014/main" id="{317DC1F8-57F9-40A8-97EC-174BA8BAE0C1}"/>
+                <a16:creationId xmlns:a16="http://schemas.microsoft.com/office/drawing/2014/main" id="{05A74514-E5B5-4A09-889A-3B20FC32F473}"/>
               </a:ext>
             </a:extLst>
           </p:cNvPr>
@@ -13072,66 +13071,157 @@
             <p:ph type="title"/>
           </p:nvPr>
         </p:nvSpPr>
-        <p:spPr>
-          <a:xfrm>
-            <a:off x="1141413" y="618518"/>
-            <a:ext cx="9905998" cy="684189"/>
-          </a:xfrm>
-        </p:spPr>
+        <p:spPr/>
         <p:txBody>
           <a:bodyPr/>
           <a:lstStyle/>
           <a:p>
             <a:r>
               <a:rPr lang="en-US" dirty="0"/>
-              <a:t>Design patterns</a:t>
+              <a:t>Conclusion</a:t>
             </a:r>
           </a:p>
         </p:txBody>
       </p:sp>
       <p:sp>
         <p:nvSpPr>
-          <p:cNvPr id="3" name="Content Placeholder 2">
+          <p:cNvPr id="3" name="TextBox 2">
             <a:extLst>
               <a:ext uri="{FF2B5EF4-FFF2-40B4-BE49-F238E27FC236}">
-                <a16:creationId xmlns:a16="http://schemas.microsoft.com/office/drawing/2014/main" id="{CF7110E4-47C0-47DA-B277-17CCEBA8008B}"/>
+                <a16:creationId xmlns:a16="http://schemas.microsoft.com/office/drawing/2014/main" id="{FA064C61-D3E1-4406-B3E9-98BD93A5195C}"/>
               </a:ext>
             </a:extLst>
           </p:cNvPr>
-          <p:cNvSpPr>
-            <a:spLocks noGrp="1"/>
-          </p:cNvSpPr>
-          <p:nvPr>
-            <p:ph idx="1"/>
-          </p:nvPr>
+          <p:cNvSpPr txBox="1"/>
+          <p:nvPr/>
         </p:nvSpPr>
         <p:spPr>
           <a:xfrm>
-            <a:off x="1141412" y="1302707"/>
-            <a:ext cx="9905999" cy="4488494"/>
+            <a:off x="1141412" y="1934249"/>
+            <a:ext cx="9905998" cy="3662541"/>
           </a:xfrm>
+          <a:prstGeom prst="rect">
+            <a:avLst/>
+          </a:prstGeom>
+          <a:noFill/>
         </p:spPr>
         <p:txBody>
-          <a:bodyPr/>
+          <a:bodyPr wrap="square" rtlCol="0">
+            <a:spAutoFit/>
+          </a:bodyPr>
           <a:lstStyle/>
           <a:p>
+            <a:pPr marL="285750" indent="-285750">
+              <a:buFont typeface="Arial" panose="020B0604020202020204" pitchFamily="34" charset="0"/>
+              <a:buChar char="•"/>
+            </a:pPr>
+            <a:r>
+              <a:rPr lang="en-US" sz="2400" dirty="0"/>
+              <a:t>Final summary</a:t>
+            </a:r>
+          </a:p>
+          <a:p>
+            <a:pPr marL="742950" lvl="1" indent="-285750">
+              <a:buFont typeface="Arial" panose="020B0604020202020204" pitchFamily="34" charset="0"/>
+              <a:buChar char="•"/>
+            </a:pPr>
+            <a:r>
+              <a:rPr lang="en-US" sz="1600" dirty="0"/>
+              <a:t>UAH themed monopoly</a:t>
+            </a:r>
+          </a:p>
+          <a:p>
+            <a:pPr marL="742950" lvl="1" indent="-285750">
+              <a:buFont typeface="Arial" panose="020B0604020202020204" pitchFamily="34" charset="0"/>
+              <a:buChar char="•"/>
+            </a:pPr>
+            <a:r>
+              <a:rPr lang="en-US" sz="1600" dirty="0"/>
+              <a:t>Tiles and cards generated from XML on startup</a:t>
+            </a:r>
+          </a:p>
+          <a:p>
+            <a:pPr marL="742950" lvl="1" indent="-285750">
+              <a:buFont typeface="Arial" panose="020B0604020202020204" pitchFamily="34" charset="0"/>
+              <a:buChar char="•"/>
+            </a:pPr>
+            <a:r>
+              <a:rPr lang="en-US" sz="1600" dirty="0"/>
+              <a:t>Dynamic events for when a player lands on a tile or draws a card</a:t>
+            </a:r>
+          </a:p>
+          <a:p>
+            <a:pPr marL="742950" lvl="1" indent="-285750">
+              <a:buFont typeface="Arial" panose="020B0604020202020204" pitchFamily="34" charset="0"/>
+              <a:buChar char="•"/>
+            </a:pPr>
+            <a:r>
+              <a:rPr lang="en-US" sz="1600" dirty="0"/>
+              <a:t>Graphical interface for players to interact with</a:t>
+            </a:r>
+          </a:p>
+          <a:p>
+            <a:endParaRPr lang="en-US" dirty="0"/>
+          </a:p>
+          <a:p>
+            <a:pPr marL="285750" indent="-285750">
+              <a:buFont typeface="Arial" panose="020B0604020202020204" pitchFamily="34" charset="0"/>
+              <a:buChar char="•"/>
+            </a:pPr>
+            <a:r>
+              <a:rPr lang="en-US" sz="2400" dirty="0"/>
+              <a:t>Questions?</a:t>
+            </a:r>
+          </a:p>
+          <a:p>
+            <a:endParaRPr lang="en-US" sz="2400" dirty="0"/>
+          </a:p>
+          <a:p>
+            <a:pPr marL="285750" indent="-285750">
+              <a:buFont typeface="Arial" panose="020B0604020202020204" pitchFamily="34" charset="0"/>
+              <a:buChar char="•"/>
+            </a:pPr>
+            <a:r>
+              <a:rPr lang="en-US" sz="2400" dirty="0"/>
+              <a:t>Our GitHub</a:t>
+            </a:r>
+          </a:p>
+          <a:p>
+            <a:pPr marL="742950" lvl="1" indent="-285750">
+              <a:buFont typeface="Arial" panose="020B0604020202020204" pitchFamily="34" charset="0"/>
+              <a:buChar char="•"/>
+            </a:pPr>
+            <a:r>
+              <a:rPr lang="en-US" dirty="0">
+                <a:hlinkClick r:id="rId2"/>
+              </a:rPr>
+              <a:t>https://github.com/SeanMitchell1994/CS321_SP2019</a:t>
+            </a:r>
+            <a:endParaRPr lang="en-US" dirty="0"/>
+          </a:p>
+          <a:p>
+            <a:pPr marL="742950" lvl="1" indent="-285750">
+              <a:buFont typeface="Arial" panose="020B0604020202020204" pitchFamily="34" charset="0"/>
+              <a:buChar char="•"/>
+            </a:pPr>
             <a:r>
               <a:rPr lang="en-US" dirty="0"/>
-              <a:t>Passive MVC</a:t>
-            </a:r>
-          </a:p>
-          <a:p>
-            <a:r>
-              <a:rPr lang="en-US" dirty="0"/>
-              <a:t>Adapter</a:t>
-            </a:r>
+              <a:t>Pull the .zip file under the v1.0 release if you want to play the game</a:t>
+            </a:r>
+          </a:p>
+          <a:p>
+            <a:pPr marL="742950" lvl="1" indent="-285750">
+              <a:buFont typeface="Arial" panose="020B0604020202020204" pitchFamily="34" charset="0"/>
+              <a:buChar char="•"/>
+            </a:pPr>
+            <a:endParaRPr lang="en-US" dirty="0"/>
           </a:p>
         </p:txBody>
       </p:sp>
     </p:spTree>
     <p:extLst>
       <p:ext uri="{BB962C8B-B14F-4D97-AF65-F5344CB8AC3E}">
-        <p14:creationId xmlns:p14="http://schemas.microsoft.com/office/powerpoint/2010/main" val="3596121615"/>
+        <p14:creationId xmlns:p14="http://schemas.microsoft.com/office/powerpoint/2010/main" val="3109034783"/>
       </p:ext>
     </p:extLst>
   </p:cSld>
@@ -13218,199 +13308,6 @@
     <p:extLst>
       <p:ext uri="{BB962C8B-B14F-4D97-AF65-F5344CB8AC3E}">
         <p14:creationId xmlns:p14="http://schemas.microsoft.com/office/powerpoint/2010/main" val="4093208736"/>
-      </p:ext>
-    </p:extLst>
-  </p:cSld>
-  <p:clrMapOvr>
-    <a:masterClrMapping/>
-  </p:clrMapOvr>
-</p:sld>
-</file>
-
-<file path=ppt/slides/slide14.xml><?xml version="1.0" encoding="utf-8"?>
-<p:sld xmlns:a="http://schemas.openxmlformats.org/drawingml/2006/main" xmlns:r="http://schemas.openxmlformats.org/officeDocument/2006/relationships" xmlns:p="http://schemas.openxmlformats.org/presentationml/2006/main">
-  <p:cSld>
-    <p:spTree>
-      <p:nvGrpSpPr>
-        <p:cNvPr id="1" name=""/>
-        <p:cNvGrpSpPr/>
-        <p:nvPr/>
-      </p:nvGrpSpPr>
-      <p:grpSpPr>
-        <a:xfrm>
-          <a:off x="0" y="0"/>
-          <a:ext cx="0" cy="0"/>
-          <a:chOff x="0" y="0"/>
-          <a:chExt cx="0" cy="0"/>
-        </a:xfrm>
-      </p:grpSpPr>
-      <p:sp>
-        <p:nvSpPr>
-          <p:cNvPr id="2" name="Title 1">
-            <a:extLst>
-              <a:ext uri="{FF2B5EF4-FFF2-40B4-BE49-F238E27FC236}">
-                <a16:creationId xmlns:a16="http://schemas.microsoft.com/office/drawing/2014/main" id="{05A74514-E5B5-4A09-889A-3B20FC32F473}"/>
-              </a:ext>
-            </a:extLst>
-          </p:cNvPr>
-          <p:cNvSpPr>
-            <a:spLocks noGrp="1"/>
-          </p:cNvSpPr>
-          <p:nvPr>
-            <p:ph type="title"/>
-          </p:nvPr>
-        </p:nvSpPr>
-        <p:spPr/>
-        <p:txBody>
-          <a:bodyPr/>
-          <a:lstStyle/>
-          <a:p>
-            <a:r>
-              <a:rPr lang="en-US" dirty="0"/>
-              <a:t>Conclusion</a:t>
-            </a:r>
-          </a:p>
-        </p:txBody>
-      </p:sp>
-      <p:sp>
-        <p:nvSpPr>
-          <p:cNvPr id="3" name="TextBox 2">
-            <a:extLst>
-              <a:ext uri="{FF2B5EF4-FFF2-40B4-BE49-F238E27FC236}">
-                <a16:creationId xmlns:a16="http://schemas.microsoft.com/office/drawing/2014/main" id="{FA064C61-D3E1-4406-B3E9-98BD93A5195C}"/>
-              </a:ext>
-            </a:extLst>
-          </p:cNvPr>
-          <p:cNvSpPr txBox="1"/>
-          <p:nvPr/>
-        </p:nvSpPr>
-        <p:spPr>
-          <a:xfrm>
-            <a:off x="1141412" y="1934249"/>
-            <a:ext cx="9905998" cy="3662541"/>
-          </a:xfrm>
-          <a:prstGeom prst="rect">
-            <a:avLst/>
-          </a:prstGeom>
-          <a:noFill/>
-        </p:spPr>
-        <p:txBody>
-          <a:bodyPr wrap="square" rtlCol="0">
-            <a:spAutoFit/>
-          </a:bodyPr>
-          <a:lstStyle/>
-          <a:p>
-            <a:pPr marL="285750" indent="-285750">
-              <a:buFont typeface="Arial" panose="020B0604020202020204" pitchFamily="34" charset="0"/>
-              <a:buChar char="•"/>
-            </a:pPr>
-            <a:r>
-              <a:rPr lang="en-US" sz="2400" dirty="0"/>
-              <a:t>Final summary</a:t>
-            </a:r>
-          </a:p>
-          <a:p>
-            <a:pPr marL="742950" lvl="1" indent="-285750">
-              <a:buFont typeface="Arial" panose="020B0604020202020204" pitchFamily="34" charset="0"/>
-              <a:buChar char="•"/>
-            </a:pPr>
-            <a:r>
-              <a:rPr lang="en-US" sz="1600" dirty="0"/>
-              <a:t>UAH themed monopoly</a:t>
-            </a:r>
-          </a:p>
-          <a:p>
-            <a:pPr marL="742950" lvl="1" indent="-285750">
-              <a:buFont typeface="Arial" panose="020B0604020202020204" pitchFamily="34" charset="0"/>
-              <a:buChar char="•"/>
-            </a:pPr>
-            <a:r>
-              <a:rPr lang="en-US" sz="1600" dirty="0"/>
-              <a:t>Tiles and cards generated from XML on startup</a:t>
-            </a:r>
-          </a:p>
-          <a:p>
-            <a:pPr marL="742950" lvl="1" indent="-285750">
-              <a:buFont typeface="Arial" panose="020B0604020202020204" pitchFamily="34" charset="0"/>
-              <a:buChar char="•"/>
-            </a:pPr>
-            <a:r>
-              <a:rPr lang="en-US" sz="1600" dirty="0"/>
-              <a:t>Dynamic events for when a player lands on a tile or draws a card</a:t>
-            </a:r>
-          </a:p>
-          <a:p>
-            <a:pPr marL="742950" lvl="1" indent="-285750">
-              <a:buFont typeface="Arial" panose="020B0604020202020204" pitchFamily="34" charset="0"/>
-              <a:buChar char="•"/>
-            </a:pPr>
-            <a:r>
-              <a:rPr lang="en-US" sz="1600" dirty="0"/>
-              <a:t>Graphical interface for players to interact with</a:t>
-            </a:r>
-          </a:p>
-          <a:p>
-            <a:endParaRPr lang="en-US" dirty="0"/>
-          </a:p>
-          <a:p>
-            <a:pPr marL="285750" indent="-285750">
-              <a:buFont typeface="Arial" panose="020B0604020202020204" pitchFamily="34" charset="0"/>
-              <a:buChar char="•"/>
-            </a:pPr>
-            <a:r>
-              <a:rPr lang="en-US" sz="2400" dirty="0"/>
-              <a:t>Questions?</a:t>
-            </a:r>
-          </a:p>
-          <a:p>
-            <a:endParaRPr lang="en-US" sz="2400" dirty="0"/>
-          </a:p>
-          <a:p>
-            <a:pPr marL="285750" indent="-285750">
-              <a:buFont typeface="Arial" panose="020B0604020202020204" pitchFamily="34" charset="0"/>
-              <a:buChar char="•"/>
-            </a:pPr>
-            <a:r>
-              <a:rPr lang="en-US" sz="2400" dirty="0"/>
-              <a:t>Our GitHub</a:t>
-            </a:r>
-          </a:p>
-          <a:p>
-            <a:pPr marL="742950" lvl="1" indent="-285750">
-              <a:buFont typeface="Arial" panose="020B0604020202020204" pitchFamily="34" charset="0"/>
-              <a:buChar char="•"/>
-            </a:pPr>
-            <a:r>
-              <a:rPr lang="en-US" dirty="0">
-                <a:hlinkClick r:id="rId2"/>
-              </a:rPr>
-              <a:t>https://github.com/SeanMitchell1994/CS321_SP2019</a:t>
-            </a:r>
-            <a:endParaRPr lang="en-US" dirty="0"/>
-          </a:p>
-          <a:p>
-            <a:pPr marL="742950" lvl="1" indent="-285750">
-              <a:buFont typeface="Arial" panose="020B0604020202020204" pitchFamily="34" charset="0"/>
-              <a:buChar char="•"/>
-            </a:pPr>
-            <a:r>
-              <a:rPr lang="en-US" dirty="0"/>
-              <a:t>Pull the .zip file under the v1.0 release if you want to play the game</a:t>
-            </a:r>
-          </a:p>
-          <a:p>
-            <a:pPr marL="742950" lvl="1" indent="-285750">
-              <a:buFont typeface="Arial" panose="020B0604020202020204" pitchFamily="34" charset="0"/>
-              <a:buChar char="•"/>
-            </a:pPr>
-            <a:endParaRPr lang="en-US" dirty="0"/>
-          </a:p>
-        </p:txBody>
-      </p:sp>
-    </p:spTree>
-    <p:extLst>
-      <p:ext uri="{BB962C8B-B14F-4D97-AF65-F5344CB8AC3E}">
-        <p14:creationId xmlns:p14="http://schemas.microsoft.com/office/powerpoint/2010/main" val="3109034783"/>
       </p:ext>
     </p:extLst>
   </p:cSld>
@@ -13710,27 +13607,29 @@
             <a:pPr marL="742950" lvl="1" indent="-285750"/>
             <a:r>
               <a:rPr lang="en-US" sz="1600" dirty="0"/>
-              <a:t>N .java files</a:t>
+              <a:t>16 .java files</a:t>
             </a:r>
           </a:p>
           <a:p>
             <a:pPr marL="742950" lvl="1" indent="-285750"/>
             <a:r>
               <a:rPr lang="en-US" sz="1600" dirty="0"/>
-              <a:t>N images</a:t>
+              <a:t>2 .XML files</a:t>
             </a:r>
           </a:p>
           <a:p>
             <a:pPr marL="742950" lvl="1" indent="-285750"/>
             <a:r>
               <a:rPr lang="en-US" sz="1600" dirty="0"/>
-              <a:t>N commits to </a:t>
-            </a:r>
-            <a:r>
-              <a:rPr lang="en-US" sz="1600" dirty="0" err="1"/>
-              <a:t>Github</a:t>
-            </a:r>
-            <a:endParaRPr lang="en-US" sz="1600" dirty="0"/>
+              <a:t>45 images</a:t>
+            </a:r>
+          </a:p>
+          <a:p>
+            <a:pPr marL="742950" lvl="1" indent="-285750"/>
+            <a:r>
+              <a:rPr lang="en-US" sz="1600" dirty="0"/>
+              <a:t>190 commits to GitHub</a:t>
+            </a:r>
           </a:p>
           <a:p>
             <a:pPr marL="742950" lvl="1" indent="-285750"/>
@@ -14183,6 +14082,147 @@
           <p:cNvPr id="2" name="Title 1">
             <a:extLst>
               <a:ext uri="{FF2B5EF4-FFF2-40B4-BE49-F238E27FC236}">
+                <a16:creationId xmlns:a16="http://schemas.microsoft.com/office/drawing/2014/main" id="{317DC1F8-57F9-40A8-97EC-174BA8BAE0C1}"/>
+              </a:ext>
+            </a:extLst>
+          </p:cNvPr>
+          <p:cNvSpPr>
+            <a:spLocks noGrp="1"/>
+          </p:cNvSpPr>
+          <p:nvPr>
+            <p:ph type="title"/>
+          </p:nvPr>
+        </p:nvSpPr>
+        <p:spPr>
+          <a:xfrm>
+            <a:off x="1141413" y="618518"/>
+            <a:ext cx="9905998" cy="684189"/>
+          </a:xfrm>
+        </p:spPr>
+        <p:txBody>
+          <a:bodyPr/>
+          <a:lstStyle/>
+          <a:p>
+            <a:r>
+              <a:rPr lang="en-US" dirty="0"/>
+              <a:t>UML diagram and Design patterns</a:t>
+            </a:r>
+          </a:p>
+        </p:txBody>
+      </p:sp>
+      <p:sp>
+        <p:nvSpPr>
+          <p:cNvPr id="3" name="Content Placeholder 2">
+            <a:extLst>
+              <a:ext uri="{FF2B5EF4-FFF2-40B4-BE49-F238E27FC236}">
+                <a16:creationId xmlns:a16="http://schemas.microsoft.com/office/drawing/2014/main" id="{CF7110E4-47C0-47DA-B277-17CCEBA8008B}"/>
+              </a:ext>
+            </a:extLst>
+          </p:cNvPr>
+          <p:cNvSpPr>
+            <a:spLocks noGrp="1"/>
+          </p:cNvSpPr>
+          <p:nvPr>
+            <p:ph idx="1"/>
+          </p:nvPr>
+        </p:nvSpPr>
+        <p:spPr>
+          <a:xfrm>
+            <a:off x="1141412" y="1302707"/>
+            <a:ext cx="9905999" cy="4488494"/>
+          </a:xfrm>
+        </p:spPr>
+        <p:txBody>
+          <a:bodyPr/>
+          <a:lstStyle/>
+          <a:p>
+            <a:r>
+              <a:rPr lang="en-US" dirty="0"/>
+              <a:t>Passive MVC</a:t>
+            </a:r>
+          </a:p>
+          <a:p>
+            <a:r>
+              <a:rPr lang="en-US" dirty="0"/>
+              <a:t>Adapter</a:t>
+            </a:r>
+          </a:p>
+        </p:txBody>
+      </p:sp>
+      <p:pic>
+        <p:nvPicPr>
+          <p:cNvPr id="4" name="Picture 3" descr="E:\School\2019 Spring\CS 321\Final Project\CS321_SP2019\uml\main_uml_simple.png">
+            <a:extLst>
+              <a:ext uri="{FF2B5EF4-FFF2-40B4-BE49-F238E27FC236}">
+                <a16:creationId xmlns:a16="http://schemas.microsoft.com/office/drawing/2014/main" id="{CDE29411-9C5A-4312-8CF3-CAA3D22F0E4D}"/>
+              </a:ext>
+            </a:extLst>
+          </p:cNvPr>
+          <p:cNvPicPr/>
+          <p:nvPr/>
+        </p:nvPicPr>
+        <p:blipFill>
+          <a:blip r:embed="rId2">
+            <a:extLst>
+              <a:ext uri="{28A0092B-C50C-407E-A947-70E740481C1C}">
+                <a14:useLocalDpi xmlns:a14="http://schemas.microsoft.com/office/drawing/2010/main" val="0"/>
+              </a:ext>
+            </a:extLst>
+          </a:blip>
+          <a:srcRect/>
+          <a:stretch>
+            <a:fillRect/>
+          </a:stretch>
+        </p:blipFill>
+        <p:spPr bwMode="auto">
+          <a:xfrm>
+            <a:off x="3294345" y="1302707"/>
+            <a:ext cx="8079288" cy="4396635"/>
+          </a:xfrm>
+          <a:prstGeom prst="rect">
+            <a:avLst/>
+          </a:prstGeom>
+          <a:noFill/>
+          <a:ln>
+            <a:noFill/>
+          </a:ln>
+        </p:spPr>
+      </p:pic>
+    </p:spTree>
+    <p:extLst>
+      <p:ext uri="{BB962C8B-B14F-4D97-AF65-F5344CB8AC3E}">
+        <p14:creationId xmlns:p14="http://schemas.microsoft.com/office/powerpoint/2010/main" val="3596121615"/>
+      </p:ext>
+    </p:extLst>
+  </p:cSld>
+  <p:clrMapOvr>
+    <a:masterClrMapping/>
+  </p:clrMapOvr>
+</p:sld>
+</file>
+
+<file path=ppt/slides/slide8.xml><?xml version="1.0" encoding="utf-8"?>
+<p:sld xmlns:a="http://schemas.openxmlformats.org/drawingml/2006/main" xmlns:r="http://schemas.openxmlformats.org/officeDocument/2006/relationships" xmlns:p="http://schemas.openxmlformats.org/presentationml/2006/main">
+  <p:cSld>
+    <p:spTree>
+      <p:nvGrpSpPr>
+        <p:cNvPr id="1" name=""/>
+        <p:cNvGrpSpPr/>
+        <p:nvPr/>
+      </p:nvGrpSpPr>
+      <p:grpSpPr>
+        <a:xfrm>
+          <a:off x="0" y="0"/>
+          <a:ext cx="0" cy="0"/>
+          <a:chOff x="0" y="0"/>
+          <a:chExt cx="0" cy="0"/>
+        </a:xfrm>
+      </p:grpSpPr>
+      <p:sp>
+        <p:nvSpPr>
+          <p:cNvPr id="2" name="Title 1">
+            <a:extLst>
+              <a:ext uri="{FF2B5EF4-FFF2-40B4-BE49-F238E27FC236}">
                 <a16:creationId xmlns:a16="http://schemas.microsoft.com/office/drawing/2014/main" id="{B8A65464-321C-4697-947E-405B23F1C870}"/>
               </a:ext>
             </a:extLst>
@@ -14313,99 +14353,6 @@
     <p:extLst>
       <p:ext uri="{BB962C8B-B14F-4D97-AF65-F5344CB8AC3E}">
         <p14:creationId xmlns:p14="http://schemas.microsoft.com/office/powerpoint/2010/main" val="3053350755"/>
-      </p:ext>
-    </p:extLst>
-  </p:cSld>
-  <p:clrMapOvr>
-    <a:masterClrMapping/>
-  </p:clrMapOvr>
-</p:sld>
-</file>
-
-<file path=ppt/slides/slide8.xml><?xml version="1.0" encoding="utf-8"?>
-<p:sld xmlns:a="http://schemas.openxmlformats.org/drawingml/2006/main" xmlns:r="http://schemas.openxmlformats.org/officeDocument/2006/relationships" xmlns:p="http://schemas.openxmlformats.org/presentationml/2006/main">
-  <p:cSld>
-    <p:spTree>
-      <p:nvGrpSpPr>
-        <p:cNvPr id="1" name=""/>
-        <p:cNvGrpSpPr/>
-        <p:nvPr/>
-      </p:nvGrpSpPr>
-      <p:grpSpPr>
-        <a:xfrm>
-          <a:off x="0" y="0"/>
-          <a:ext cx="0" cy="0"/>
-          <a:chOff x="0" y="0"/>
-          <a:chExt cx="0" cy="0"/>
-        </a:xfrm>
-      </p:grpSpPr>
-      <p:sp>
-        <p:nvSpPr>
-          <p:cNvPr id="2" name="Title 1">
-            <a:extLst>
-              <a:ext uri="{FF2B5EF4-FFF2-40B4-BE49-F238E27FC236}">
-                <a16:creationId xmlns:a16="http://schemas.microsoft.com/office/drawing/2014/main" id="{55341980-0FB1-496F-8870-FE38AF1B4DFE}"/>
-              </a:ext>
-            </a:extLst>
-          </p:cNvPr>
-          <p:cNvSpPr>
-            <a:spLocks noGrp="1"/>
-          </p:cNvSpPr>
-          <p:nvPr>
-            <p:ph type="title"/>
-          </p:nvPr>
-        </p:nvSpPr>
-        <p:spPr/>
-        <p:txBody>
-          <a:bodyPr/>
-          <a:lstStyle/>
-          <a:p>
-            <a:r>
-              <a:rPr lang="en-US" dirty="0"/>
-              <a:t>UML Diagram</a:t>
-            </a:r>
-          </a:p>
-        </p:txBody>
-      </p:sp>
-      <p:pic>
-        <p:nvPicPr>
-          <p:cNvPr id="9" name="Content Placeholder 8">
-            <a:extLst>
-              <a:ext uri="{FF2B5EF4-FFF2-40B4-BE49-F238E27FC236}">
-                <a16:creationId xmlns:a16="http://schemas.microsoft.com/office/drawing/2014/main" id="{70B05435-0C19-43A5-9DC1-A155520C8550}"/>
-              </a:ext>
-            </a:extLst>
-          </p:cNvPr>
-          <p:cNvPicPr>
-            <a:picLocks noGrp="1" noChangeAspect="1"/>
-          </p:cNvPicPr>
-          <p:nvPr>
-            <p:ph idx="1"/>
-          </p:nvPr>
-        </p:nvPicPr>
-        <p:blipFill>
-          <a:blip r:embed="rId2">
-            <a:extLst>
-              <a:ext uri="{28A0092B-C50C-407E-A947-70E740481C1C}">
-                <a14:useLocalDpi xmlns:a14="http://schemas.microsoft.com/office/drawing/2010/main" val="0"/>
-              </a:ext>
-            </a:extLst>
-          </a:blip>
-          <a:stretch>
-            <a:fillRect/>
-          </a:stretch>
-        </p:blipFill>
-        <p:spPr>
-          <a:xfrm>
-            <a:off x="827431" y="356239"/>
-            <a:ext cx="10533961" cy="6145522"/>
-          </a:xfrm>
-        </p:spPr>
-      </p:pic>
-    </p:spTree>
-    <p:extLst>
-      <p:ext uri="{BB962C8B-B14F-4D97-AF65-F5344CB8AC3E}">
-        <p14:creationId xmlns:p14="http://schemas.microsoft.com/office/powerpoint/2010/main" val="3729806697"/>
       </p:ext>
     </p:extLst>
   </p:cSld>

</xml_diff>